<commit_message>
Updated simulation and outputs
</commit_message>
<xml_diff>
--- a/05-outputs/tables/tbl1-desc.pptx
+++ b/05-outputs/tables/tbl1-desc.pptx
@@ -3455,7 +3455,7 @@
                           <a:ea typeface="Arial"/>
                           <a:sym typeface="Arial"/>
                         </a:rPr>
-                        <a:t>13.03</a:t>
+                        <a:t>18.45</a:t>
                       </a:r>
                     </a:p>
                   </a:txBody>
@@ -3512,7 +3512,7 @@
                           <a:ea typeface="Arial"/>
                           <a:sym typeface="Arial"/>
                         </a:rPr>
-                        <a:t>0.81</a:t>
+                        <a:t>3.02</a:t>
                       </a:r>
                     </a:p>
                   </a:txBody>
@@ -3569,7 +3569,7 @@
                           <a:ea typeface="Arial"/>
                           <a:sym typeface="Arial"/>
                         </a:rPr>
-                        <a:t>13.06</a:t>
+                        <a:t>19.38</a:t>
                       </a:r>
                     </a:p>
                   </a:txBody>
@@ -3626,7 +3626,7 @@
                           <a:ea typeface="Arial"/>
                           <a:sym typeface="Arial"/>
                         </a:rPr>
-                        <a:t>0.88</a:t>
+                        <a:t>2.94</a:t>
                       </a:r>
                     </a:p>
                   </a:txBody>
@@ -3683,7 +3683,7 @@
                           <a:ea typeface="Arial"/>
                           <a:sym typeface="Arial"/>
                         </a:rPr>
-                        <a:t>12.97</a:t>
+                        <a:t>18.00</a:t>
                       </a:r>
                     </a:p>
                   </a:txBody>
@@ -3740,7 +3740,7 @@
                           <a:ea typeface="Arial"/>
                           <a:sym typeface="Arial"/>
                         </a:rPr>
-                        <a:t>0.71</a:t>
+                        <a:t>3.28</a:t>
                       </a:r>
                     </a:p>
                   </a:txBody>
@@ -3913,7 +3913,7 @@
                           <a:ea typeface="Arial"/>
                           <a:sym typeface="Arial"/>
                         </a:rPr>
-                        <a:t>70.77</a:t>
+                        <a:t>67.24</a:t>
                       </a:r>
                     </a:p>
                   </a:txBody>
@@ -3970,7 +3970,7 @@
                           <a:ea typeface="Arial"/>
                           <a:sym typeface="Arial"/>
                         </a:rPr>
-                        <a:t>25.95</a:t>
+                        <a:t>13.98</a:t>
                       </a:r>
                     </a:p>
                   </a:txBody>
@@ -4027,7 +4027,7 @@
                           <a:ea typeface="Arial"/>
                           <a:sym typeface="Arial"/>
                         </a:rPr>
-                        <a:t>49.59</a:t>
+                        <a:t>62.19</a:t>
                       </a:r>
                     </a:p>
                   </a:txBody>
@@ -4084,7 +4084,7 @@
                           <a:ea typeface="Arial"/>
                           <a:sym typeface="Arial"/>
                         </a:rPr>
-                        <a:t>29.09</a:t>
+                        <a:t>15.34</a:t>
                       </a:r>
                     </a:p>
                   </a:txBody>
@@ -4141,7 +4141,7 @@
                           <a:ea typeface="Arial"/>
                           <a:sym typeface="Arial"/>
                         </a:rPr>
-                        <a:t>49.83</a:t>
+                        <a:t>58.40</a:t>
                       </a:r>
                     </a:p>
                   </a:txBody>
@@ -4198,7 +4198,7 @@
                           <a:ea typeface="Arial"/>
                           <a:sym typeface="Arial"/>
                         </a:rPr>
-                        <a:t>24.76</a:t>
+                        <a:t>16.93</a:t>
                       </a:r>
                     </a:p>
                   </a:txBody>
@@ -4371,7 +4371,7 @@
                           <a:ea typeface="Arial"/>
                           <a:sym typeface="Arial"/>
                         </a:rPr>
-                        <a:t>29.79</a:t>
+                        <a:t>3.06</a:t>
                       </a:r>
                     </a:p>
                   </a:txBody>
@@ -4428,7 +4428,7 @@
                           <a:ea typeface="Arial"/>
                           <a:sym typeface="Arial"/>
                         </a:rPr>
-                        <a:t>8.96</a:t>
+                        <a:t>0.24</a:t>
                       </a:r>
                     </a:p>
                   </a:txBody>
@@ -4485,7 +4485,7 @@
                           <a:ea typeface="Arial"/>
                           <a:sym typeface="Arial"/>
                         </a:rPr>
-                        <a:t>20.06</a:t>
+                        <a:t>3.56</a:t>
                       </a:r>
                     </a:p>
                   </a:txBody>
@@ -4542,7 +4542,7 @@
                           <a:ea typeface="Arial"/>
                           <a:sym typeface="Arial"/>
                         </a:rPr>
-                        <a:t>10.19</a:t>
+                        <a:t>0.67</a:t>
                       </a:r>
                     </a:p>
                   </a:txBody>
@@ -4599,7 +4599,7 @@
                           <a:ea typeface="Arial"/>
                           <a:sym typeface="Arial"/>
                         </a:rPr>
-                        <a:t>18.71</a:t>
+                        <a:t>4.51</a:t>
                       </a:r>
                     </a:p>
                   </a:txBody>
@@ -4656,7 +4656,7 @@
                           <a:ea typeface="Arial"/>
                           <a:sym typeface="Arial"/>
                         </a:rPr>
-                        <a:t>9.98</a:t>
+                        <a:t>1.09</a:t>
                       </a:r>
                     </a:p>
                   </a:txBody>
@@ -4837,7 +4837,7 @@
                           <a:ea typeface="Arial"/>
                           <a:sym typeface="Arial"/>
                         </a:rPr>
-                        <a:t>13.12</a:t>
+                        <a:t>12.21</a:t>
                       </a:r>
                     </a:p>
                   </a:txBody>
@@ -4898,7 +4898,7 @@
                           <a:ea typeface="Arial"/>
                           <a:sym typeface="Arial"/>
                         </a:rPr>
-                        <a:t>2.03</a:t>
+                        <a:t>2.85</a:t>
                       </a:r>
                     </a:p>
                   </a:txBody>
@@ -4959,7 +4959,7 @@
                           <a:ea typeface="Arial"/>
                           <a:sym typeface="Arial"/>
                         </a:rPr>
-                        <a:t>13.69</a:t>
+                        <a:t>12.88</a:t>
                       </a:r>
                     </a:p>
                   </a:txBody>
@@ -5020,7 +5020,7 @@
                           <a:ea typeface="Arial"/>
                           <a:sym typeface="Arial"/>
                         </a:rPr>
-                        <a:t>1.64</a:t>
+                        <a:t>2.57</a:t>
                       </a:r>
                     </a:p>
                   </a:txBody>
@@ -5081,7 +5081,7 @@
                           <a:ea typeface="Arial"/>
                           <a:sym typeface="Arial"/>
                         </a:rPr>
-                        <a:t>12.14</a:t>
+                        <a:t>12.20</a:t>
                       </a:r>
                     </a:p>
                   </a:txBody>
@@ -5142,7 +5142,7 @@
                           <a:ea typeface="Arial"/>
                           <a:sym typeface="Arial"/>
                         </a:rPr>
-                        <a:t>1.82</a:t>
+                        <a:t>2.78</a:t>
                       </a:r>
                     </a:p>
                   </a:txBody>

</xml_diff>